<commit_message>
#00028 : update class diagram and 설계ppt
</commit_message>
<xml_diff>
--- a/doc/설계ppt.pptx
+++ b/doc/설계ppt.pptx
@@ -204,6 +204,7 @@
           <a:p>
             <a:fld id="{6281474C-C6E6-4401-8DFA-CCC14A0FEB9F}" type="datetimeFigureOut">
               <a:rPr lang="ko-KR" altLang="en-US" smtClean="0"/>
+              <a:pPr/>
               <a:t>2017-10-16</a:t>
             </a:fld>
             <a:endParaRPr lang="ko-KR" altLang="en-US"/>
@@ -365,6 +366,7 @@
           <a:p>
             <a:fld id="{138C3442-CBDD-4FCC-B3E9-94C88264DC46}" type="slidenum">
               <a:rPr lang="ko-KR" altLang="en-US" smtClean="0"/>
+              <a:pPr/>
               <a:t>‹#›</a:t>
             </a:fld>
             <a:endParaRPr lang="ko-KR" altLang="en-US"/>
@@ -536,6 +538,7 @@
           <a:p>
             <a:fld id="{138C3442-CBDD-4FCC-B3E9-94C88264DC46}" type="slidenum">
               <a:rPr lang="ko-KR" altLang="en-US" smtClean="0"/>
+              <a:pPr/>
               <a:t>3</a:t>
             </a:fld>
             <a:endParaRPr lang="ko-KR" altLang="en-US"/>
@@ -731,6 +734,7 @@
           <a:p>
             <a:fld id="{4284F295-8DDE-45EA-BDD5-71450A0F89F7}" type="datetimeFigureOut">
               <a:rPr lang="ko-KR" altLang="en-US" smtClean="0"/>
+              <a:pPr/>
               <a:t>2017-10-16</a:t>
             </a:fld>
             <a:endParaRPr lang="ko-KR" altLang="en-US"/>
@@ -773,6 +777,7 @@
           <a:p>
             <a:fld id="{33C91B1E-4A2F-45E3-8BD2-865ED503DD68}" type="slidenum">
               <a:rPr lang="ko-KR" altLang="en-US" smtClean="0"/>
+              <a:pPr/>
               <a:t>‹#›</a:t>
             </a:fld>
             <a:endParaRPr lang="ko-KR" altLang="en-US"/>
@@ -896,6 +901,7 @@
           <a:p>
             <a:fld id="{4284F295-8DDE-45EA-BDD5-71450A0F89F7}" type="datetimeFigureOut">
               <a:rPr lang="ko-KR" altLang="en-US" smtClean="0"/>
+              <a:pPr/>
               <a:t>2017-10-16</a:t>
             </a:fld>
             <a:endParaRPr lang="ko-KR" altLang="en-US"/>
@@ -938,6 +944,7 @@
           <a:p>
             <a:fld id="{33C91B1E-4A2F-45E3-8BD2-865ED503DD68}" type="slidenum">
               <a:rPr lang="ko-KR" altLang="en-US" smtClean="0"/>
+              <a:pPr/>
               <a:t>‹#›</a:t>
             </a:fld>
             <a:endParaRPr lang="ko-KR" altLang="en-US"/>
@@ -1071,6 +1078,7 @@
           <a:p>
             <a:fld id="{4284F295-8DDE-45EA-BDD5-71450A0F89F7}" type="datetimeFigureOut">
               <a:rPr lang="ko-KR" altLang="en-US" smtClean="0"/>
+              <a:pPr/>
               <a:t>2017-10-16</a:t>
             </a:fld>
             <a:endParaRPr lang="ko-KR" altLang="en-US"/>
@@ -1113,6 +1121,7 @@
           <a:p>
             <a:fld id="{33C91B1E-4A2F-45E3-8BD2-865ED503DD68}" type="slidenum">
               <a:rPr lang="ko-KR" altLang="en-US" smtClean="0"/>
+              <a:pPr/>
               <a:t>‹#›</a:t>
             </a:fld>
             <a:endParaRPr lang="ko-KR" altLang="en-US"/>
@@ -1236,6 +1245,7 @@
           <a:p>
             <a:fld id="{4284F295-8DDE-45EA-BDD5-71450A0F89F7}" type="datetimeFigureOut">
               <a:rPr lang="ko-KR" altLang="en-US" smtClean="0"/>
+              <a:pPr/>
               <a:t>2017-10-16</a:t>
             </a:fld>
             <a:endParaRPr lang="ko-KR" altLang="en-US"/>
@@ -1278,6 +1288,7 @@
           <a:p>
             <a:fld id="{33C91B1E-4A2F-45E3-8BD2-865ED503DD68}" type="slidenum">
               <a:rPr lang="ko-KR" altLang="en-US" smtClean="0"/>
+              <a:pPr/>
               <a:t>‹#›</a:t>
             </a:fld>
             <a:endParaRPr lang="ko-KR" altLang="en-US"/>
@@ -1477,6 +1488,7 @@
           <a:p>
             <a:fld id="{4284F295-8DDE-45EA-BDD5-71450A0F89F7}" type="datetimeFigureOut">
               <a:rPr lang="ko-KR" altLang="en-US" smtClean="0"/>
+              <a:pPr/>
               <a:t>2017-10-16</a:t>
             </a:fld>
             <a:endParaRPr lang="ko-KR" altLang="en-US"/>
@@ -1519,6 +1531,7 @@
           <a:p>
             <a:fld id="{33C91B1E-4A2F-45E3-8BD2-865ED503DD68}" type="slidenum">
               <a:rPr lang="ko-KR" altLang="en-US" smtClean="0"/>
+              <a:pPr/>
               <a:t>‹#›</a:t>
             </a:fld>
             <a:endParaRPr lang="ko-KR" altLang="en-US"/>
@@ -1760,6 +1773,7 @@
           <a:p>
             <a:fld id="{4284F295-8DDE-45EA-BDD5-71450A0F89F7}" type="datetimeFigureOut">
               <a:rPr lang="ko-KR" altLang="en-US" smtClean="0"/>
+              <a:pPr/>
               <a:t>2017-10-16</a:t>
             </a:fld>
             <a:endParaRPr lang="ko-KR" altLang="en-US"/>
@@ -1802,6 +1816,7 @@
           <a:p>
             <a:fld id="{33C91B1E-4A2F-45E3-8BD2-865ED503DD68}" type="slidenum">
               <a:rPr lang="ko-KR" altLang="en-US" smtClean="0"/>
+              <a:pPr/>
               <a:t>‹#›</a:t>
             </a:fld>
             <a:endParaRPr lang="ko-KR" altLang="en-US"/>
@@ -2177,6 +2192,7 @@
           <a:p>
             <a:fld id="{4284F295-8DDE-45EA-BDD5-71450A0F89F7}" type="datetimeFigureOut">
               <a:rPr lang="ko-KR" altLang="en-US" smtClean="0"/>
+              <a:pPr/>
               <a:t>2017-10-16</a:t>
             </a:fld>
             <a:endParaRPr lang="ko-KR" altLang="en-US"/>
@@ -2219,6 +2235,7 @@
           <a:p>
             <a:fld id="{33C91B1E-4A2F-45E3-8BD2-865ED503DD68}" type="slidenum">
               <a:rPr lang="ko-KR" altLang="en-US" smtClean="0"/>
+              <a:pPr/>
               <a:t>‹#›</a:t>
             </a:fld>
             <a:endParaRPr lang="ko-KR" altLang="en-US"/>
@@ -2290,6 +2307,7 @@
           <a:p>
             <a:fld id="{4284F295-8DDE-45EA-BDD5-71450A0F89F7}" type="datetimeFigureOut">
               <a:rPr lang="ko-KR" altLang="en-US" smtClean="0"/>
+              <a:pPr/>
               <a:t>2017-10-16</a:t>
             </a:fld>
             <a:endParaRPr lang="ko-KR" altLang="en-US"/>
@@ -2332,6 +2350,7 @@
           <a:p>
             <a:fld id="{33C91B1E-4A2F-45E3-8BD2-865ED503DD68}" type="slidenum">
               <a:rPr lang="ko-KR" altLang="en-US" smtClean="0"/>
+              <a:pPr/>
               <a:t>‹#›</a:t>
             </a:fld>
             <a:endParaRPr lang="ko-KR" altLang="en-US"/>
@@ -2380,6 +2399,7 @@
           <a:p>
             <a:fld id="{4284F295-8DDE-45EA-BDD5-71450A0F89F7}" type="datetimeFigureOut">
               <a:rPr lang="ko-KR" altLang="en-US" smtClean="0"/>
+              <a:pPr/>
               <a:t>2017-10-16</a:t>
             </a:fld>
             <a:endParaRPr lang="ko-KR" altLang="en-US"/>
@@ -2422,6 +2442,7 @@
           <a:p>
             <a:fld id="{33C91B1E-4A2F-45E3-8BD2-865ED503DD68}" type="slidenum">
               <a:rPr lang="ko-KR" altLang="en-US" smtClean="0"/>
+              <a:pPr/>
               <a:t>‹#›</a:t>
             </a:fld>
             <a:endParaRPr lang="ko-KR" altLang="en-US"/>
@@ -2652,6 +2673,7 @@
           <a:p>
             <a:fld id="{4284F295-8DDE-45EA-BDD5-71450A0F89F7}" type="datetimeFigureOut">
               <a:rPr lang="ko-KR" altLang="en-US" smtClean="0"/>
+              <a:pPr/>
               <a:t>2017-10-16</a:t>
             </a:fld>
             <a:endParaRPr lang="ko-KR" altLang="en-US"/>
@@ -2694,6 +2716,7 @@
           <a:p>
             <a:fld id="{33C91B1E-4A2F-45E3-8BD2-865ED503DD68}" type="slidenum">
               <a:rPr lang="ko-KR" altLang="en-US" smtClean="0"/>
+              <a:pPr/>
               <a:t>‹#›</a:t>
             </a:fld>
             <a:endParaRPr lang="ko-KR" altLang="en-US"/>
@@ -2900,6 +2923,7 @@
           <a:p>
             <a:fld id="{4284F295-8DDE-45EA-BDD5-71450A0F89F7}" type="datetimeFigureOut">
               <a:rPr lang="ko-KR" altLang="en-US" smtClean="0"/>
+              <a:pPr/>
               <a:t>2017-10-16</a:t>
             </a:fld>
             <a:endParaRPr lang="ko-KR" altLang="en-US"/>
@@ -2942,6 +2966,7 @@
           <a:p>
             <a:fld id="{33C91B1E-4A2F-45E3-8BD2-865ED503DD68}" type="slidenum">
               <a:rPr lang="ko-KR" altLang="en-US" smtClean="0"/>
+              <a:pPr/>
               <a:t>‹#›</a:t>
             </a:fld>
             <a:endParaRPr lang="ko-KR" altLang="en-US"/>
@@ -3108,6 +3133,7 @@
           <a:p>
             <a:fld id="{4284F295-8DDE-45EA-BDD5-71450A0F89F7}" type="datetimeFigureOut">
               <a:rPr lang="ko-KR" altLang="en-US" smtClean="0"/>
+              <a:pPr/>
               <a:t>2017-10-16</a:t>
             </a:fld>
             <a:endParaRPr lang="ko-KR" altLang="en-US"/>
@@ -3186,6 +3212,7 @@
           <a:p>
             <a:fld id="{33C91B1E-4A2F-45E3-8BD2-865ED503DD68}" type="slidenum">
               <a:rPr lang="ko-KR" altLang="en-US" smtClean="0"/>
+              <a:pPr/>
               <a:t>‹#›</a:t>
             </a:fld>
             <a:endParaRPr lang="ko-KR" altLang="en-US"/>
@@ -4673,32 +4700,9 @@
           <a:chExt cx="0" cy="0"/>
         </a:xfrm>
       </p:grpSpPr>
-      <p:sp>
-        <p:nvSpPr>
-          <p:cNvPr id="2" name="제목 1"/>
-          <p:cNvSpPr>
-            <a:spLocks noGrp="1"/>
-          </p:cNvSpPr>
-          <p:nvPr>
-            <p:ph type="title"/>
-          </p:nvPr>
-        </p:nvSpPr>
-        <p:spPr/>
-        <p:txBody>
-          <a:bodyPr/>
-          <a:lstStyle/>
-          <a:p>
-            <a:r>
-              <a:rPr lang="en-US" altLang="ko-KR" dirty="0" smtClean="0"/>
-              <a:t>Class Diagram</a:t>
-            </a:r>
-            <a:endParaRPr lang="ko-KR" altLang="en-US" dirty="0"/>
-          </a:p>
-        </p:txBody>
-      </p:sp>
       <p:pic>
         <p:nvPicPr>
-          <p:cNvPr id="4" name="내용 개체 틀 3" descr="class diagram.PNG"/>
+          <p:cNvPr id="6" name="내용 개체 틀 5" descr="Blank Diagram - Page 1.png"/>
           <p:cNvPicPr>
             <a:picLocks noGrp="1" noChangeAspect="1"/>
           </p:cNvPicPr>
@@ -4714,11 +4718,34 @@
         </p:blipFill>
         <p:spPr>
           <a:xfrm>
-            <a:off x="1187624" y="1196752"/>
-            <a:ext cx="7488832" cy="5649600"/>
+            <a:off x="251520" y="0"/>
+            <a:ext cx="9145016" cy="7066603"/>
           </a:xfrm>
         </p:spPr>
       </p:pic>
+      <p:sp>
+        <p:nvSpPr>
+          <p:cNvPr id="2" name="제목 1"/>
+          <p:cNvSpPr>
+            <a:spLocks noGrp="1"/>
+          </p:cNvSpPr>
+          <p:nvPr>
+            <p:ph type="title"/>
+          </p:nvPr>
+        </p:nvSpPr>
+        <p:spPr/>
+        <p:txBody>
+          <a:bodyPr/>
+          <a:lstStyle/>
+          <a:p>
+            <a:r>
+              <a:rPr lang="en-US" altLang="ko-KR" dirty="0" smtClean="0"/>
+              <a:t>Class Diagram</a:t>
+            </a:r>
+            <a:endParaRPr lang="ko-KR" altLang="en-US" dirty="0"/>
+          </a:p>
+        </p:txBody>
+      </p:sp>
     </p:spTree>
   </p:cSld>
   <p:clrMapOvr>

</xml_diff>